<commit_message>
update metadata and one fig
</commit_message>
<xml_diff>
--- a/Figures/piecing_figures.pptx
+++ b/Figures/piecing_figures.pptx
@@ -6,8 +6,9 @@
   </p:sldMasterIdLst>
   <p:sldIdLst>
     <p:sldId id="256" r:id="rId2"/>
-    <p:sldId id="257" r:id="rId3"/>
-    <p:sldId id="258" r:id="rId4"/>
+    <p:sldId id="259" r:id="rId3"/>
+    <p:sldId id="257" r:id="rId4"/>
+    <p:sldId id="258" r:id="rId5"/>
   </p:sldIdLst>
   <p:sldSz cx="9144000" cy="6858000" type="screen4x3"/>
   <p:notesSz cx="6858000" cy="9144000"/>
@@ -245,7 +246,7 @@
           <a:p>
             <a:fld id="{75EBE5B8-545A-486E-8B03-7579748D156F}" type="datetimeFigureOut">
               <a:rPr lang="en-US" smtClean="0"/>
-              <a:t>5/3/2019</a:t>
+              <a:t>5/6/2019</a:t>
             </a:fld>
             <a:endParaRPr lang="en-US"/>
           </a:p>
@@ -415,7 +416,7 @@
           <a:p>
             <a:fld id="{75EBE5B8-545A-486E-8B03-7579748D156F}" type="datetimeFigureOut">
               <a:rPr lang="en-US" smtClean="0"/>
-              <a:t>5/3/2019</a:t>
+              <a:t>5/6/2019</a:t>
             </a:fld>
             <a:endParaRPr lang="en-US"/>
           </a:p>
@@ -595,7 +596,7 @@
           <a:p>
             <a:fld id="{75EBE5B8-545A-486E-8B03-7579748D156F}" type="datetimeFigureOut">
               <a:rPr lang="en-US" smtClean="0"/>
-              <a:t>5/3/2019</a:t>
+              <a:t>5/6/2019</a:t>
             </a:fld>
             <a:endParaRPr lang="en-US"/>
           </a:p>
@@ -765,7 +766,7 @@
           <a:p>
             <a:fld id="{75EBE5B8-545A-486E-8B03-7579748D156F}" type="datetimeFigureOut">
               <a:rPr lang="en-US" smtClean="0"/>
-              <a:t>5/3/2019</a:t>
+              <a:t>5/6/2019</a:t>
             </a:fld>
             <a:endParaRPr lang="en-US"/>
           </a:p>
@@ -1009,7 +1010,7 @@
           <a:p>
             <a:fld id="{75EBE5B8-545A-486E-8B03-7579748D156F}" type="datetimeFigureOut">
               <a:rPr lang="en-US" smtClean="0"/>
-              <a:t>5/3/2019</a:t>
+              <a:t>5/6/2019</a:t>
             </a:fld>
             <a:endParaRPr lang="en-US"/>
           </a:p>
@@ -1241,7 +1242,7 @@
           <a:p>
             <a:fld id="{75EBE5B8-545A-486E-8B03-7579748D156F}" type="datetimeFigureOut">
               <a:rPr lang="en-US" smtClean="0"/>
-              <a:t>5/3/2019</a:t>
+              <a:t>5/6/2019</a:t>
             </a:fld>
             <a:endParaRPr lang="en-US"/>
           </a:p>
@@ -1608,7 +1609,7 @@
           <a:p>
             <a:fld id="{75EBE5B8-545A-486E-8B03-7579748D156F}" type="datetimeFigureOut">
               <a:rPr lang="en-US" smtClean="0"/>
-              <a:t>5/3/2019</a:t>
+              <a:t>5/6/2019</a:t>
             </a:fld>
             <a:endParaRPr lang="en-US"/>
           </a:p>
@@ -1726,7 +1727,7 @@
           <a:p>
             <a:fld id="{75EBE5B8-545A-486E-8B03-7579748D156F}" type="datetimeFigureOut">
               <a:rPr lang="en-US" smtClean="0"/>
-              <a:t>5/3/2019</a:t>
+              <a:t>5/6/2019</a:t>
             </a:fld>
             <a:endParaRPr lang="en-US"/>
           </a:p>
@@ -1821,7 +1822,7 @@
           <a:p>
             <a:fld id="{75EBE5B8-545A-486E-8B03-7579748D156F}" type="datetimeFigureOut">
               <a:rPr lang="en-US" smtClean="0"/>
-              <a:t>5/3/2019</a:t>
+              <a:t>5/6/2019</a:t>
             </a:fld>
             <a:endParaRPr lang="en-US"/>
           </a:p>
@@ -2098,7 +2099,7 @@
           <a:p>
             <a:fld id="{75EBE5B8-545A-486E-8B03-7579748D156F}" type="datetimeFigureOut">
               <a:rPr lang="en-US" smtClean="0"/>
-              <a:t>5/3/2019</a:t>
+              <a:t>5/6/2019</a:t>
             </a:fld>
             <a:endParaRPr lang="en-US"/>
           </a:p>
@@ -2355,7 +2356,7 @@
           <a:p>
             <a:fld id="{75EBE5B8-545A-486E-8B03-7579748D156F}" type="datetimeFigureOut">
               <a:rPr lang="en-US" smtClean="0"/>
-              <a:t>5/3/2019</a:t>
+              <a:t>5/6/2019</a:t>
             </a:fld>
             <a:endParaRPr lang="en-US"/>
           </a:p>
@@ -2568,7 +2569,7 @@
           <a:p>
             <a:fld id="{75EBE5B8-545A-486E-8B03-7579748D156F}" type="datetimeFigureOut">
               <a:rPr lang="en-US" smtClean="0"/>
-              <a:t>5/3/2019</a:t>
+              <a:t>5/6/2019</a:t>
             </a:fld>
             <a:endParaRPr lang="en-US"/>
           </a:p>
@@ -3064,6 +3065,210 @@
       </p:grpSpPr>
       <p:pic>
         <p:nvPicPr>
+          <p:cNvPr id="4" name="Picture 3"/>
+          <p:cNvPicPr>
+            <a:picLocks noChangeAspect="1"/>
+          </p:cNvPicPr>
+          <p:nvPr/>
+        </p:nvPicPr>
+        <p:blipFill>
+          <a:blip r:embed="rId2" cstate="print">
+            <a:extLst>
+              <a:ext uri="{28A0092B-C50C-407E-A947-70E740481C1C}">
+                <a14:useLocalDpi xmlns:a14="http://schemas.microsoft.com/office/drawing/2010/main" val="0"/>
+              </a:ext>
+            </a:extLst>
+          </a:blip>
+          <a:stretch>
+            <a:fillRect/>
+          </a:stretch>
+        </p:blipFill>
+        <p:spPr>
+          <a:xfrm>
+            <a:off x="2514596" y="685794"/>
+            <a:ext cx="4114808" cy="5486411"/>
+          </a:xfrm>
+          <a:prstGeom prst="rect">
+            <a:avLst/>
+          </a:prstGeom>
+        </p:spPr>
+      </p:pic>
+      <p:sp>
+        <p:nvSpPr>
+          <p:cNvPr id="6" name="TextBox 5"/>
+          <p:cNvSpPr txBox="1"/>
+          <p:nvPr/>
+        </p:nvSpPr>
+        <p:spPr>
+          <a:xfrm>
+            <a:off x="3190464" y="5910595"/>
+            <a:ext cx="616225" cy="261610"/>
+          </a:xfrm>
+          <a:prstGeom prst="rect">
+            <a:avLst/>
+          </a:prstGeom>
+          <a:noFill/>
+        </p:spPr>
+        <p:txBody>
+          <a:bodyPr wrap="square" rtlCol="0">
+            <a:spAutoFit/>
+          </a:bodyPr>
+          <a:lstStyle/>
+          <a:p>
+            <a:r>
+              <a:rPr lang="en-US" sz="1050" dirty="0" smtClean="0">
+                <a:latin typeface="Arial" panose="020B0604020202020204" pitchFamily="34" charset="0"/>
+                <a:cs typeface="Arial" panose="020B0604020202020204" pitchFamily="34" charset="0"/>
+              </a:rPr>
+              <a:t>7.90%</a:t>
+            </a:r>
+            <a:endParaRPr lang="en-US" sz="1050" dirty="0">
+              <a:latin typeface="Arial" panose="020B0604020202020204" pitchFamily="34" charset="0"/>
+              <a:cs typeface="Arial" panose="020B0604020202020204" pitchFamily="34" charset="0"/>
+            </a:endParaRPr>
+          </a:p>
+        </p:txBody>
+      </p:sp>
+      <p:sp>
+        <p:nvSpPr>
+          <p:cNvPr id="7" name="TextBox 6"/>
+          <p:cNvSpPr txBox="1"/>
+          <p:nvPr/>
+        </p:nvSpPr>
+        <p:spPr>
+          <a:xfrm>
+            <a:off x="4038603" y="5910595"/>
+            <a:ext cx="722240" cy="253916"/>
+          </a:xfrm>
+          <a:prstGeom prst="rect">
+            <a:avLst/>
+          </a:prstGeom>
+          <a:noFill/>
+        </p:spPr>
+        <p:txBody>
+          <a:bodyPr wrap="square" rtlCol="0">
+            <a:spAutoFit/>
+          </a:bodyPr>
+          <a:lstStyle/>
+          <a:p>
+            <a:r>
+              <a:rPr lang="en-US" sz="1050" dirty="0" smtClean="0">
+                <a:latin typeface="Arial" panose="020B0604020202020204" pitchFamily="34" charset="0"/>
+                <a:cs typeface="Arial" panose="020B0604020202020204" pitchFamily="34" charset="0"/>
+              </a:rPr>
+              <a:t>44.08%</a:t>
+            </a:r>
+            <a:endParaRPr lang="en-US" sz="1050" dirty="0">
+              <a:latin typeface="Arial" panose="020B0604020202020204" pitchFamily="34" charset="0"/>
+              <a:cs typeface="Arial" panose="020B0604020202020204" pitchFamily="34" charset="0"/>
+            </a:endParaRPr>
+          </a:p>
+        </p:txBody>
+      </p:sp>
+      <p:sp>
+        <p:nvSpPr>
+          <p:cNvPr id="8" name="TextBox 7"/>
+          <p:cNvSpPr txBox="1"/>
+          <p:nvPr/>
+        </p:nvSpPr>
+        <p:spPr>
+          <a:xfrm>
+            <a:off x="4916560" y="5910595"/>
+            <a:ext cx="722240" cy="253916"/>
+          </a:xfrm>
+          <a:prstGeom prst="rect">
+            <a:avLst/>
+          </a:prstGeom>
+          <a:noFill/>
+        </p:spPr>
+        <p:txBody>
+          <a:bodyPr wrap="square" rtlCol="0">
+            <a:spAutoFit/>
+          </a:bodyPr>
+          <a:lstStyle/>
+          <a:p>
+            <a:r>
+              <a:rPr lang="en-US" sz="1050" dirty="0" smtClean="0">
+                <a:latin typeface="Arial" panose="020B0604020202020204" pitchFamily="34" charset="0"/>
+                <a:cs typeface="Arial" panose="020B0604020202020204" pitchFamily="34" charset="0"/>
+              </a:rPr>
+              <a:t>14.51%</a:t>
+            </a:r>
+            <a:endParaRPr lang="en-US" sz="1050" dirty="0">
+              <a:latin typeface="Arial" panose="020B0604020202020204" pitchFamily="34" charset="0"/>
+              <a:cs typeface="Arial" panose="020B0604020202020204" pitchFamily="34" charset="0"/>
+            </a:endParaRPr>
+          </a:p>
+        </p:txBody>
+      </p:sp>
+      <p:sp>
+        <p:nvSpPr>
+          <p:cNvPr id="9" name="TextBox 8"/>
+          <p:cNvSpPr txBox="1"/>
+          <p:nvPr/>
+        </p:nvSpPr>
+        <p:spPr>
+          <a:xfrm>
+            <a:off x="5772982" y="5910595"/>
+            <a:ext cx="722240" cy="253916"/>
+          </a:xfrm>
+          <a:prstGeom prst="rect">
+            <a:avLst/>
+          </a:prstGeom>
+          <a:noFill/>
+        </p:spPr>
+        <p:txBody>
+          <a:bodyPr wrap="square" rtlCol="0">
+            <a:spAutoFit/>
+          </a:bodyPr>
+          <a:lstStyle/>
+          <a:p>
+            <a:r>
+              <a:rPr lang="en-US" sz="1050" dirty="0" smtClean="0">
+                <a:latin typeface="Arial" panose="020B0604020202020204" pitchFamily="34" charset="0"/>
+                <a:cs typeface="Arial" panose="020B0604020202020204" pitchFamily="34" charset="0"/>
+              </a:rPr>
+              <a:t>33.50%</a:t>
+            </a:r>
+            <a:endParaRPr lang="en-US" sz="1050" dirty="0">
+              <a:latin typeface="Arial" panose="020B0604020202020204" pitchFamily="34" charset="0"/>
+              <a:cs typeface="Arial" panose="020B0604020202020204" pitchFamily="34" charset="0"/>
+            </a:endParaRPr>
+          </a:p>
+        </p:txBody>
+      </p:sp>
+    </p:spTree>
+    <p:extLst>
+      <p:ext uri="{BB962C8B-B14F-4D97-AF65-F5344CB8AC3E}">
+        <p14:creationId xmlns:p14="http://schemas.microsoft.com/office/powerpoint/2010/main" val="1652656808"/>
+      </p:ext>
+    </p:extLst>
+  </p:cSld>
+  <p:clrMapOvr>
+    <a:masterClrMapping/>
+  </p:clrMapOvr>
+</p:sld>
+</file>
+
+<file path=ppt/slides/slide3.xml><?xml version="1.0" encoding="utf-8"?>
+<p:sld xmlns:a="http://schemas.openxmlformats.org/drawingml/2006/main" xmlns:r="http://schemas.openxmlformats.org/officeDocument/2006/relationships" xmlns:p="http://schemas.openxmlformats.org/presentationml/2006/main">
+  <p:cSld>
+    <p:spTree>
+      <p:nvGrpSpPr>
+        <p:cNvPr id="1" name=""/>
+        <p:cNvGrpSpPr/>
+        <p:nvPr/>
+      </p:nvGrpSpPr>
+      <p:grpSpPr>
+        <a:xfrm>
+          <a:off x="0" y="0"/>
+          <a:ext cx="0" cy="0"/>
+          <a:chOff x="0" y="0"/>
+          <a:chExt cx="0" cy="0"/>
+        </a:xfrm>
+      </p:grpSpPr>
+      <p:pic>
+        <p:nvPicPr>
           <p:cNvPr id="2" name="Picture 1"/>
           <p:cNvPicPr>
             <a:picLocks noChangeAspect="1"/>
@@ -3502,7 +3707,7 @@
 </p:sld>
 </file>
 
-<file path=ppt/slides/slide3.xml><?xml version="1.0" encoding="utf-8"?>
+<file path=ppt/slides/slide4.xml><?xml version="1.0" encoding="utf-8"?>
 <p:sld xmlns:a="http://schemas.openxmlformats.org/drawingml/2006/main" xmlns:r="http://schemas.openxmlformats.org/officeDocument/2006/relationships" xmlns:p="http://schemas.openxmlformats.org/presentationml/2006/main">
   <p:cSld>
     <p:spTree>

</xml_diff>

<commit_message>
update conn barplot x axis order
</commit_message>
<xml_diff>
--- a/Figures/piecing_figures.pptx
+++ b/Figures/piecing_figures.pptx
@@ -246,7 +246,7 @@
           <a:p>
             <a:fld id="{75EBE5B8-545A-486E-8B03-7579748D156F}" type="datetimeFigureOut">
               <a:rPr lang="en-US" smtClean="0"/>
-              <a:t>5/6/2019</a:t>
+              <a:t>5/16/2019</a:t>
             </a:fld>
             <a:endParaRPr lang="en-US"/>
           </a:p>
@@ -416,7 +416,7 @@
           <a:p>
             <a:fld id="{75EBE5B8-545A-486E-8B03-7579748D156F}" type="datetimeFigureOut">
               <a:rPr lang="en-US" smtClean="0"/>
-              <a:t>5/6/2019</a:t>
+              <a:t>5/16/2019</a:t>
             </a:fld>
             <a:endParaRPr lang="en-US"/>
           </a:p>
@@ -596,7 +596,7 @@
           <a:p>
             <a:fld id="{75EBE5B8-545A-486E-8B03-7579748D156F}" type="datetimeFigureOut">
               <a:rPr lang="en-US" smtClean="0"/>
-              <a:t>5/6/2019</a:t>
+              <a:t>5/16/2019</a:t>
             </a:fld>
             <a:endParaRPr lang="en-US"/>
           </a:p>
@@ -766,7 +766,7 @@
           <a:p>
             <a:fld id="{75EBE5B8-545A-486E-8B03-7579748D156F}" type="datetimeFigureOut">
               <a:rPr lang="en-US" smtClean="0"/>
-              <a:t>5/6/2019</a:t>
+              <a:t>5/16/2019</a:t>
             </a:fld>
             <a:endParaRPr lang="en-US"/>
           </a:p>
@@ -1010,7 +1010,7 @@
           <a:p>
             <a:fld id="{75EBE5B8-545A-486E-8B03-7579748D156F}" type="datetimeFigureOut">
               <a:rPr lang="en-US" smtClean="0"/>
-              <a:t>5/6/2019</a:t>
+              <a:t>5/16/2019</a:t>
             </a:fld>
             <a:endParaRPr lang="en-US"/>
           </a:p>
@@ -1242,7 +1242,7 @@
           <a:p>
             <a:fld id="{75EBE5B8-545A-486E-8B03-7579748D156F}" type="datetimeFigureOut">
               <a:rPr lang="en-US" smtClean="0"/>
-              <a:t>5/6/2019</a:t>
+              <a:t>5/16/2019</a:t>
             </a:fld>
             <a:endParaRPr lang="en-US"/>
           </a:p>
@@ -1609,7 +1609,7 @@
           <a:p>
             <a:fld id="{75EBE5B8-545A-486E-8B03-7579748D156F}" type="datetimeFigureOut">
               <a:rPr lang="en-US" smtClean="0"/>
-              <a:t>5/6/2019</a:t>
+              <a:t>5/16/2019</a:t>
             </a:fld>
             <a:endParaRPr lang="en-US"/>
           </a:p>
@@ -1727,7 +1727,7 @@
           <a:p>
             <a:fld id="{75EBE5B8-545A-486E-8B03-7579748D156F}" type="datetimeFigureOut">
               <a:rPr lang="en-US" smtClean="0"/>
-              <a:t>5/6/2019</a:t>
+              <a:t>5/16/2019</a:t>
             </a:fld>
             <a:endParaRPr lang="en-US"/>
           </a:p>
@@ -1822,7 +1822,7 @@
           <a:p>
             <a:fld id="{75EBE5B8-545A-486E-8B03-7579748D156F}" type="datetimeFigureOut">
               <a:rPr lang="en-US" smtClean="0"/>
-              <a:t>5/6/2019</a:t>
+              <a:t>5/16/2019</a:t>
             </a:fld>
             <a:endParaRPr lang="en-US"/>
           </a:p>
@@ -2099,7 +2099,7 @@
           <a:p>
             <a:fld id="{75EBE5B8-545A-486E-8B03-7579748D156F}" type="datetimeFigureOut">
               <a:rPr lang="en-US" smtClean="0"/>
-              <a:t>5/6/2019</a:t>
+              <a:t>5/16/2019</a:t>
             </a:fld>
             <a:endParaRPr lang="en-US"/>
           </a:p>
@@ -2356,7 +2356,7 @@
           <a:p>
             <a:fld id="{75EBE5B8-545A-486E-8B03-7579748D156F}" type="datetimeFigureOut">
               <a:rPr lang="en-US" smtClean="0"/>
-              <a:t>5/6/2019</a:t>
+              <a:t>5/16/2019</a:t>
             </a:fld>
             <a:endParaRPr lang="en-US"/>
           </a:p>
@@ -2569,7 +2569,7 @@
           <a:p>
             <a:fld id="{75EBE5B8-545A-486E-8B03-7579748D156F}" type="datetimeFigureOut">
               <a:rPr lang="en-US" smtClean="0"/>
-              <a:t>5/6/2019</a:t>
+              <a:t>5/16/2019</a:t>
             </a:fld>
             <a:endParaRPr lang="en-US"/>
           </a:p>
@@ -3065,7 +3065,7 @@
       </p:grpSpPr>
       <p:pic>
         <p:nvPicPr>
-          <p:cNvPr id="4" name="Picture 3"/>
+          <p:cNvPr id="3" name="Picture 2"/>
           <p:cNvPicPr>
             <a:picLocks noChangeAspect="1"/>
           </p:cNvPicPr>
@@ -3102,7 +3102,7 @@
         <p:spPr>
           <a:xfrm>
             <a:off x="3190464" y="5910595"/>
-            <a:ext cx="616225" cy="261610"/>
+            <a:ext cx="692422" cy="253916"/>
           </a:xfrm>
           <a:prstGeom prst="rect">
             <a:avLst/>
@@ -3120,7 +3120,21 @@
                 <a:latin typeface="Arial" panose="020B0604020202020204" pitchFamily="34" charset="0"/>
                 <a:cs typeface="Arial" panose="020B0604020202020204" pitchFamily="34" charset="0"/>
               </a:rPr>
-              <a:t>7.90%</a:t>
+              <a:t>33.5</a:t>
+            </a:r>
+            <a:r>
+              <a:rPr lang="en-US" sz="1050" dirty="0" smtClean="0">
+                <a:latin typeface="Arial" panose="020B0604020202020204" pitchFamily="34" charset="0"/>
+                <a:cs typeface="Arial" panose="020B0604020202020204" pitchFamily="34" charset="0"/>
+              </a:rPr>
+              <a:t>0</a:t>
+            </a:r>
+            <a:r>
+              <a:rPr lang="en-US" sz="1050" dirty="0" smtClean="0">
+                <a:latin typeface="Arial" panose="020B0604020202020204" pitchFamily="34" charset="0"/>
+                <a:cs typeface="Arial" panose="020B0604020202020204" pitchFamily="34" charset="0"/>
+              </a:rPr>
+              <a:t>%</a:t>
             </a:r>
             <a:endParaRPr lang="en-US" sz="1050" dirty="0">
               <a:latin typeface="Arial" panose="020B0604020202020204" pitchFamily="34" charset="0"/>
@@ -3138,6 +3152,49 @@
         <p:spPr>
           <a:xfrm>
             <a:off x="4038603" y="5910595"/>
+            <a:ext cx="722240" cy="253916"/>
+          </a:xfrm>
+          <a:prstGeom prst="rect">
+            <a:avLst/>
+          </a:prstGeom>
+          <a:noFill/>
+        </p:spPr>
+        <p:txBody>
+          <a:bodyPr wrap="square" rtlCol="0">
+            <a:spAutoFit/>
+          </a:bodyPr>
+          <a:lstStyle/>
+          <a:p>
+            <a:r>
+              <a:rPr lang="en-US" sz="1050" dirty="0" smtClean="0">
+                <a:latin typeface="Arial" panose="020B0604020202020204" pitchFamily="34" charset="0"/>
+                <a:cs typeface="Arial" panose="020B0604020202020204" pitchFamily="34" charset="0"/>
+              </a:rPr>
+              <a:t>14.51</a:t>
+            </a:r>
+            <a:r>
+              <a:rPr lang="en-US" sz="1050" dirty="0" smtClean="0">
+                <a:latin typeface="Arial" panose="020B0604020202020204" pitchFamily="34" charset="0"/>
+                <a:cs typeface="Arial" panose="020B0604020202020204" pitchFamily="34" charset="0"/>
+              </a:rPr>
+              <a:t>%</a:t>
+            </a:r>
+            <a:endParaRPr lang="en-US" sz="1050" dirty="0">
+              <a:latin typeface="Arial" panose="020B0604020202020204" pitchFamily="34" charset="0"/>
+              <a:cs typeface="Arial" panose="020B0604020202020204" pitchFamily="34" charset="0"/>
+            </a:endParaRPr>
+          </a:p>
+        </p:txBody>
+      </p:sp>
+      <p:sp>
+        <p:nvSpPr>
+          <p:cNvPr id="8" name="TextBox 7"/>
+          <p:cNvSpPr txBox="1"/>
+          <p:nvPr/>
+        </p:nvSpPr>
+        <p:spPr>
+          <a:xfrm>
+            <a:off x="4916560" y="5910595"/>
             <a:ext cx="722240" cy="253916"/>
           </a:xfrm>
           <a:prstGeom prst="rect">
@@ -3167,13 +3224,13 @@
       </p:sp>
       <p:sp>
         <p:nvSpPr>
-          <p:cNvPr id="8" name="TextBox 7"/>
+          <p:cNvPr id="9" name="TextBox 8"/>
           <p:cNvSpPr txBox="1"/>
           <p:nvPr/>
         </p:nvSpPr>
         <p:spPr>
           <a:xfrm>
-            <a:off x="4916560" y="5910595"/>
+            <a:off x="5772982" y="5910595"/>
             <a:ext cx="722240" cy="253916"/>
           </a:xfrm>
           <a:prstGeom prst="rect">
@@ -3192,43 +3249,14 @@
                 <a:latin typeface="Arial" panose="020B0604020202020204" pitchFamily="34" charset="0"/>
                 <a:cs typeface="Arial" panose="020B0604020202020204" pitchFamily="34" charset="0"/>
               </a:rPr>
-              <a:t>14.51%</a:t>
-            </a:r>
-            <a:endParaRPr lang="en-US" sz="1050" dirty="0">
-              <a:latin typeface="Arial" panose="020B0604020202020204" pitchFamily="34" charset="0"/>
-              <a:cs typeface="Arial" panose="020B0604020202020204" pitchFamily="34" charset="0"/>
-            </a:endParaRPr>
-          </a:p>
-        </p:txBody>
-      </p:sp>
-      <p:sp>
-        <p:nvSpPr>
-          <p:cNvPr id="9" name="TextBox 8"/>
-          <p:cNvSpPr txBox="1"/>
-          <p:nvPr/>
-        </p:nvSpPr>
-        <p:spPr>
-          <a:xfrm>
-            <a:off x="5772982" y="5910595"/>
-            <a:ext cx="722240" cy="253916"/>
-          </a:xfrm>
-          <a:prstGeom prst="rect">
-            <a:avLst/>
-          </a:prstGeom>
-          <a:noFill/>
-        </p:spPr>
-        <p:txBody>
-          <a:bodyPr wrap="square" rtlCol="0">
-            <a:spAutoFit/>
-          </a:bodyPr>
-          <a:lstStyle/>
-          <a:p>
+              <a:t>7.90</a:t>
+            </a:r>
             <a:r>
               <a:rPr lang="en-US" sz="1050" dirty="0" smtClean="0">
                 <a:latin typeface="Arial" panose="020B0604020202020204" pitchFamily="34" charset="0"/>
                 <a:cs typeface="Arial" panose="020B0604020202020204" pitchFamily="34" charset="0"/>
               </a:rPr>
-              <a:t>33.50%</a:t>
+              <a:t>%</a:t>
             </a:r>
             <a:endParaRPr lang="en-US" sz="1050" dirty="0">
               <a:latin typeface="Arial" panose="020B0604020202020204" pitchFamily="34" charset="0"/>

</xml_diff>

<commit_message>
updating figs with 80 pct threshold
</commit_message>
<xml_diff>
--- a/Figures/piecing_figures.pptx
+++ b/Figures/piecing_figures.pptx
@@ -246,7 +246,7 @@
           <a:p>
             <a:fld id="{75EBE5B8-545A-486E-8B03-7579748D156F}" type="datetimeFigureOut">
               <a:rPr lang="en-US" smtClean="0"/>
-              <a:t>5/16/2019</a:t>
+              <a:t>7/31/2019</a:t>
             </a:fld>
             <a:endParaRPr lang="en-US"/>
           </a:p>
@@ -416,7 +416,7 @@
           <a:p>
             <a:fld id="{75EBE5B8-545A-486E-8B03-7579748D156F}" type="datetimeFigureOut">
               <a:rPr lang="en-US" smtClean="0"/>
-              <a:t>5/16/2019</a:t>
+              <a:t>7/31/2019</a:t>
             </a:fld>
             <a:endParaRPr lang="en-US"/>
           </a:p>
@@ -596,7 +596,7 @@
           <a:p>
             <a:fld id="{75EBE5B8-545A-486E-8B03-7579748D156F}" type="datetimeFigureOut">
               <a:rPr lang="en-US" smtClean="0"/>
-              <a:t>5/16/2019</a:t>
+              <a:t>7/31/2019</a:t>
             </a:fld>
             <a:endParaRPr lang="en-US"/>
           </a:p>
@@ -766,7 +766,7 @@
           <a:p>
             <a:fld id="{75EBE5B8-545A-486E-8B03-7579748D156F}" type="datetimeFigureOut">
               <a:rPr lang="en-US" smtClean="0"/>
-              <a:t>5/16/2019</a:t>
+              <a:t>7/31/2019</a:t>
             </a:fld>
             <a:endParaRPr lang="en-US"/>
           </a:p>
@@ -1010,7 +1010,7 @@
           <a:p>
             <a:fld id="{75EBE5B8-545A-486E-8B03-7579748D156F}" type="datetimeFigureOut">
               <a:rPr lang="en-US" smtClean="0"/>
-              <a:t>5/16/2019</a:t>
+              <a:t>7/31/2019</a:t>
             </a:fld>
             <a:endParaRPr lang="en-US"/>
           </a:p>
@@ -1242,7 +1242,7 @@
           <a:p>
             <a:fld id="{75EBE5B8-545A-486E-8B03-7579748D156F}" type="datetimeFigureOut">
               <a:rPr lang="en-US" smtClean="0"/>
-              <a:t>5/16/2019</a:t>
+              <a:t>7/31/2019</a:t>
             </a:fld>
             <a:endParaRPr lang="en-US"/>
           </a:p>
@@ -1609,7 +1609,7 @@
           <a:p>
             <a:fld id="{75EBE5B8-545A-486E-8B03-7579748D156F}" type="datetimeFigureOut">
               <a:rPr lang="en-US" smtClean="0"/>
-              <a:t>5/16/2019</a:t>
+              <a:t>7/31/2019</a:t>
             </a:fld>
             <a:endParaRPr lang="en-US"/>
           </a:p>
@@ -1727,7 +1727,7 @@
           <a:p>
             <a:fld id="{75EBE5B8-545A-486E-8B03-7579748D156F}" type="datetimeFigureOut">
               <a:rPr lang="en-US" smtClean="0"/>
-              <a:t>5/16/2019</a:t>
+              <a:t>7/31/2019</a:t>
             </a:fld>
             <a:endParaRPr lang="en-US"/>
           </a:p>
@@ -1822,7 +1822,7 @@
           <a:p>
             <a:fld id="{75EBE5B8-545A-486E-8B03-7579748D156F}" type="datetimeFigureOut">
               <a:rPr lang="en-US" smtClean="0"/>
-              <a:t>5/16/2019</a:t>
+              <a:t>7/31/2019</a:t>
             </a:fld>
             <a:endParaRPr lang="en-US"/>
           </a:p>
@@ -2099,7 +2099,7 @@
           <a:p>
             <a:fld id="{75EBE5B8-545A-486E-8B03-7579748D156F}" type="datetimeFigureOut">
               <a:rPr lang="en-US" smtClean="0"/>
-              <a:t>5/16/2019</a:t>
+              <a:t>7/31/2019</a:t>
             </a:fld>
             <a:endParaRPr lang="en-US"/>
           </a:p>
@@ -2356,7 +2356,7 @@
           <a:p>
             <a:fld id="{75EBE5B8-545A-486E-8B03-7579748D156F}" type="datetimeFigureOut">
               <a:rPr lang="en-US" smtClean="0"/>
-              <a:t>5/16/2019</a:t>
+              <a:t>7/31/2019</a:t>
             </a:fld>
             <a:endParaRPr lang="en-US"/>
           </a:p>
@@ -2569,7 +2569,7 @@
           <a:p>
             <a:fld id="{75EBE5B8-545A-486E-8B03-7579748D156F}" type="datetimeFigureOut">
               <a:rPr lang="en-US" smtClean="0"/>
-              <a:t>5/16/2019</a:t>
+              <a:t>7/31/2019</a:t>
             </a:fld>
             <a:endParaRPr lang="en-US"/>
           </a:p>
@@ -2976,7 +2976,7 @@
       </p:grpSpPr>
       <p:pic>
         <p:nvPicPr>
-          <p:cNvPr id="4" name="Picture 3"/>
+          <p:cNvPr id="2" name="Picture 1"/>
           <p:cNvPicPr>
             <a:picLocks noChangeAspect="1"/>
           </p:cNvPicPr>
@@ -3006,7 +3006,7 @@
       </p:pic>
       <p:pic>
         <p:nvPicPr>
-          <p:cNvPr id="5" name="Picture 4"/>
+          <p:cNvPr id="3" name="Picture 2"/>
           <p:cNvPicPr>
             <a:picLocks noChangeAspect="1"/>
           </p:cNvPicPr>
@@ -3020,13 +3020,13 @@
               </a:ext>
             </a:extLst>
           </a:blip>
-          <a:srcRect l="2549" t="5217" r="1986" b="62464"/>
+          <a:srcRect l="2361" t="5362" r="2361" b="62609"/>
           <a:stretch/>
         </p:blipFill>
         <p:spPr>
           <a:xfrm>
-            <a:off x="3756992" y="3734791"/>
-            <a:ext cx="2773017" cy="1214897"/>
+            <a:off x="3508513" y="3695035"/>
+            <a:ext cx="2998230" cy="1304348"/>
           </a:xfrm>
           <a:prstGeom prst="rect">
             <a:avLst/>
@@ -3120,64 +3120,43 @@
                 <a:latin typeface="Arial" panose="020B0604020202020204" pitchFamily="34" charset="0"/>
                 <a:cs typeface="Arial" panose="020B0604020202020204" pitchFamily="34" charset="0"/>
               </a:rPr>
-              <a:t>33.5</a:t>
-            </a:r>
+              <a:t>33.50%</a:t>
+            </a:r>
+            <a:endParaRPr lang="en-US" sz="1050" dirty="0">
+              <a:latin typeface="Arial" panose="020B0604020202020204" pitchFamily="34" charset="0"/>
+              <a:cs typeface="Arial" panose="020B0604020202020204" pitchFamily="34" charset="0"/>
+            </a:endParaRPr>
+          </a:p>
+        </p:txBody>
+      </p:sp>
+      <p:sp>
+        <p:nvSpPr>
+          <p:cNvPr id="7" name="TextBox 6"/>
+          <p:cNvSpPr txBox="1"/>
+          <p:nvPr/>
+        </p:nvSpPr>
+        <p:spPr>
+          <a:xfrm>
+            <a:off x="4038603" y="5910595"/>
+            <a:ext cx="722240" cy="253916"/>
+          </a:xfrm>
+          <a:prstGeom prst="rect">
+            <a:avLst/>
+          </a:prstGeom>
+          <a:noFill/>
+        </p:spPr>
+        <p:txBody>
+          <a:bodyPr wrap="square" rtlCol="0">
+            <a:spAutoFit/>
+          </a:bodyPr>
+          <a:lstStyle/>
+          <a:p>
             <a:r>
               <a:rPr lang="en-US" sz="1050" dirty="0" smtClean="0">
                 <a:latin typeface="Arial" panose="020B0604020202020204" pitchFamily="34" charset="0"/>
                 <a:cs typeface="Arial" panose="020B0604020202020204" pitchFamily="34" charset="0"/>
               </a:rPr>
-              <a:t>0</a:t>
-            </a:r>
-            <a:r>
-              <a:rPr lang="en-US" sz="1050" dirty="0" smtClean="0">
-                <a:latin typeface="Arial" panose="020B0604020202020204" pitchFamily="34" charset="0"/>
-                <a:cs typeface="Arial" panose="020B0604020202020204" pitchFamily="34" charset="0"/>
-              </a:rPr>
-              <a:t>%</a:t>
-            </a:r>
-            <a:endParaRPr lang="en-US" sz="1050" dirty="0">
-              <a:latin typeface="Arial" panose="020B0604020202020204" pitchFamily="34" charset="0"/>
-              <a:cs typeface="Arial" panose="020B0604020202020204" pitchFamily="34" charset="0"/>
-            </a:endParaRPr>
-          </a:p>
-        </p:txBody>
-      </p:sp>
-      <p:sp>
-        <p:nvSpPr>
-          <p:cNvPr id="7" name="TextBox 6"/>
-          <p:cNvSpPr txBox="1"/>
-          <p:nvPr/>
-        </p:nvSpPr>
-        <p:spPr>
-          <a:xfrm>
-            <a:off x="4038603" y="5910595"/>
-            <a:ext cx="722240" cy="253916"/>
-          </a:xfrm>
-          <a:prstGeom prst="rect">
-            <a:avLst/>
-          </a:prstGeom>
-          <a:noFill/>
-        </p:spPr>
-        <p:txBody>
-          <a:bodyPr wrap="square" rtlCol="0">
-            <a:spAutoFit/>
-          </a:bodyPr>
-          <a:lstStyle/>
-          <a:p>
-            <a:r>
-              <a:rPr lang="en-US" sz="1050" dirty="0" smtClean="0">
-                <a:latin typeface="Arial" panose="020B0604020202020204" pitchFamily="34" charset="0"/>
-                <a:cs typeface="Arial" panose="020B0604020202020204" pitchFamily="34" charset="0"/>
-              </a:rPr>
-              <a:t>14.51</a:t>
-            </a:r>
-            <a:r>
-              <a:rPr lang="en-US" sz="1050" dirty="0" smtClean="0">
-                <a:latin typeface="Arial" panose="020B0604020202020204" pitchFamily="34" charset="0"/>
-                <a:cs typeface="Arial" panose="020B0604020202020204" pitchFamily="34" charset="0"/>
-              </a:rPr>
-              <a:t>%</a:t>
+              <a:t>14.51%</a:t>
             </a:r>
             <a:endParaRPr lang="en-US" sz="1050" dirty="0">
               <a:latin typeface="Arial" panose="020B0604020202020204" pitchFamily="34" charset="0"/>
@@ -3249,14 +3228,7 @@
                 <a:latin typeface="Arial" panose="020B0604020202020204" pitchFamily="34" charset="0"/>
                 <a:cs typeface="Arial" panose="020B0604020202020204" pitchFamily="34" charset="0"/>
               </a:rPr>
-              <a:t>7.90</a:t>
-            </a:r>
-            <a:r>
-              <a:rPr lang="en-US" sz="1050" dirty="0" smtClean="0">
-                <a:latin typeface="Arial" panose="020B0604020202020204" pitchFamily="34" charset="0"/>
-                <a:cs typeface="Arial" panose="020B0604020202020204" pitchFamily="34" charset="0"/>
-              </a:rPr>
-              <a:t>%</a:t>
+              <a:t>7.90%</a:t>
             </a:r>
             <a:endParaRPr lang="en-US" sz="1050" dirty="0">
               <a:latin typeface="Arial" panose="020B0604020202020204" pitchFamily="34" charset="0"/>

</xml_diff>

<commit_message>
removing unused old fig
</commit_message>
<xml_diff>
--- a/Figures/piecing_figures.pptx
+++ b/Figures/piecing_figures.pptx
@@ -246,7 +246,7 @@
           <a:p>
             <a:fld id="{75EBE5B8-545A-486E-8B03-7579748D156F}" type="datetimeFigureOut">
               <a:rPr lang="en-US" smtClean="0"/>
-              <a:t>7/31/2019</a:t>
+              <a:t>8/1/2019</a:t>
             </a:fld>
             <a:endParaRPr lang="en-US"/>
           </a:p>
@@ -416,7 +416,7 @@
           <a:p>
             <a:fld id="{75EBE5B8-545A-486E-8B03-7579748D156F}" type="datetimeFigureOut">
               <a:rPr lang="en-US" smtClean="0"/>
-              <a:t>7/31/2019</a:t>
+              <a:t>8/1/2019</a:t>
             </a:fld>
             <a:endParaRPr lang="en-US"/>
           </a:p>
@@ -596,7 +596,7 @@
           <a:p>
             <a:fld id="{75EBE5B8-545A-486E-8B03-7579748D156F}" type="datetimeFigureOut">
               <a:rPr lang="en-US" smtClean="0"/>
-              <a:t>7/31/2019</a:t>
+              <a:t>8/1/2019</a:t>
             </a:fld>
             <a:endParaRPr lang="en-US"/>
           </a:p>
@@ -766,7 +766,7 @@
           <a:p>
             <a:fld id="{75EBE5B8-545A-486E-8B03-7579748D156F}" type="datetimeFigureOut">
               <a:rPr lang="en-US" smtClean="0"/>
-              <a:t>7/31/2019</a:t>
+              <a:t>8/1/2019</a:t>
             </a:fld>
             <a:endParaRPr lang="en-US"/>
           </a:p>
@@ -1010,7 +1010,7 @@
           <a:p>
             <a:fld id="{75EBE5B8-545A-486E-8B03-7579748D156F}" type="datetimeFigureOut">
               <a:rPr lang="en-US" smtClean="0"/>
-              <a:t>7/31/2019</a:t>
+              <a:t>8/1/2019</a:t>
             </a:fld>
             <a:endParaRPr lang="en-US"/>
           </a:p>
@@ -1242,7 +1242,7 @@
           <a:p>
             <a:fld id="{75EBE5B8-545A-486E-8B03-7579748D156F}" type="datetimeFigureOut">
               <a:rPr lang="en-US" smtClean="0"/>
-              <a:t>7/31/2019</a:t>
+              <a:t>8/1/2019</a:t>
             </a:fld>
             <a:endParaRPr lang="en-US"/>
           </a:p>
@@ -1609,7 +1609,7 @@
           <a:p>
             <a:fld id="{75EBE5B8-545A-486E-8B03-7579748D156F}" type="datetimeFigureOut">
               <a:rPr lang="en-US" smtClean="0"/>
-              <a:t>7/31/2019</a:t>
+              <a:t>8/1/2019</a:t>
             </a:fld>
             <a:endParaRPr lang="en-US"/>
           </a:p>
@@ -1727,7 +1727,7 @@
           <a:p>
             <a:fld id="{75EBE5B8-545A-486E-8B03-7579748D156F}" type="datetimeFigureOut">
               <a:rPr lang="en-US" smtClean="0"/>
-              <a:t>7/31/2019</a:t>
+              <a:t>8/1/2019</a:t>
             </a:fld>
             <a:endParaRPr lang="en-US"/>
           </a:p>
@@ -1822,7 +1822,7 @@
           <a:p>
             <a:fld id="{75EBE5B8-545A-486E-8B03-7579748D156F}" type="datetimeFigureOut">
               <a:rPr lang="en-US" smtClean="0"/>
-              <a:t>7/31/2019</a:t>
+              <a:t>8/1/2019</a:t>
             </a:fld>
             <a:endParaRPr lang="en-US"/>
           </a:p>
@@ -2099,7 +2099,7 @@
           <a:p>
             <a:fld id="{75EBE5B8-545A-486E-8B03-7579748D156F}" type="datetimeFigureOut">
               <a:rPr lang="en-US" smtClean="0"/>
-              <a:t>7/31/2019</a:t>
+              <a:t>8/1/2019</a:t>
             </a:fld>
             <a:endParaRPr lang="en-US"/>
           </a:p>
@@ -2356,7 +2356,7 @@
           <a:p>
             <a:fld id="{75EBE5B8-545A-486E-8B03-7579748D156F}" type="datetimeFigureOut">
               <a:rPr lang="en-US" smtClean="0"/>
-              <a:t>7/31/2019</a:t>
+              <a:t>8/1/2019</a:t>
             </a:fld>
             <a:endParaRPr lang="en-US"/>
           </a:p>
@@ -2569,7 +2569,7 @@
           <a:p>
             <a:fld id="{75EBE5B8-545A-486E-8B03-7579748D156F}" type="datetimeFigureOut">
               <a:rPr lang="en-US" smtClean="0"/>
-              <a:t>7/31/2019</a:t>
+              <a:t>8/1/2019</a:t>
             </a:fld>
             <a:endParaRPr lang="en-US"/>
           </a:p>
@@ -3065,7 +3065,7 @@
       </p:grpSpPr>
       <p:pic>
         <p:nvPicPr>
-          <p:cNvPr id="3" name="Picture 2"/>
+          <p:cNvPr id="2" name="Picture 1"/>
           <p:cNvPicPr>
             <a:picLocks noChangeAspect="1"/>
           </p:cNvPicPr>

</xml_diff>